<commit_message>
description mise à jours locals
</commit_message>
<xml_diff>
--- a/Presentation_Projet/Presentation_du_projet.pptx
+++ b/Presentation_Projet/Presentation_du_projet.pptx
@@ -5,24 +5,24 @@
     <p:sldMasterId id="2147483648" r:id="rId1"/>
   </p:sldMasterIdLst>
   <p:notesMasterIdLst>
-    <p:notesMasterId r:id="rId15"/>
+    <p:notesMasterId r:id="rId14"/>
   </p:notesMasterIdLst>
   <p:handoutMasterIdLst>
-    <p:handoutMasterId r:id="rId16"/>
+    <p:handoutMasterId r:id="rId15"/>
   </p:handoutMasterIdLst>
   <p:sldIdLst>
-    <p:sldId id="258" r:id="rId3"/>
-    <p:sldId id="264" r:id="rId4"/>
-    <p:sldId id="275" r:id="rId5"/>
-    <p:sldId id="262" r:id="rId6"/>
-    <p:sldId id="277" r:id="rId7"/>
-    <p:sldId id="276" r:id="rId8"/>
-    <p:sldId id="284" r:id="rId9"/>
-    <p:sldId id="265" r:id="rId10"/>
-    <p:sldId id="263" r:id="rId11"/>
-    <p:sldId id="259" r:id="rId12"/>
-    <p:sldId id="278" r:id="rId13"/>
-    <p:sldId id="274" r:id="rId14"/>
+    <p:sldId id="258" r:id="rId2"/>
+    <p:sldId id="264" r:id="rId3"/>
+    <p:sldId id="275" r:id="rId4"/>
+    <p:sldId id="262" r:id="rId5"/>
+    <p:sldId id="277" r:id="rId6"/>
+    <p:sldId id="276" r:id="rId7"/>
+    <p:sldId id="284" r:id="rId8"/>
+    <p:sldId id="265" r:id="rId9"/>
+    <p:sldId id="263" r:id="rId10"/>
+    <p:sldId id="259" r:id="rId11"/>
+    <p:sldId id="278" r:id="rId12"/>
+    <p:sldId id="274" r:id="rId13"/>
   </p:sldIdLst>
   <p:sldSz cx="12192000" cy="6858000"/>
   <p:notesSz cx="6858000" cy="9144000"/>
@@ -121,6 +121,11 @@
       </a:defRPr>
     </a:lvl9pPr>
   </p:defaultTextStyle>
+  <p:extLst>
+    <p:ext uri="{EFAFB233-063F-42B5-8137-9DF3F51BA10A}">
+      <p15:sldGuideLst xmlns:p15="http://schemas.microsoft.com/office/powerpoint/2012/main"/>
+    </p:ext>
+  </p:extLst>
 </p:presentation>
 </file>
 
@@ -206,6 +211,7 @@
           <a:p>
             <a:fld id="{0F9B84EA-7D68-4D60-9CB1-D50884785D1C}" type="datetimeFigureOut">
               <a:rPr lang="zh-CN" altLang="en-US" smtClean="0"/>
+              <a:t>2024/7/27</a:t>
             </a:fld>
             <a:endParaRPr lang="zh-CN" altLang="en-US"/>
           </a:p>
@@ -271,6 +277,7 @@
           <a:p>
             <a:fld id="{8D4E0FC9-F1F8-4FAE-9988-3BA365CFD46F}" type="slidenum">
               <a:rPr lang="zh-CN" altLang="en-US" smtClean="0"/>
+              <a:t>‹N°›</a:t>
             </a:fld>
             <a:endParaRPr lang="zh-CN" altLang="en-US"/>
           </a:p>
@@ -364,6 +371,7 @@
           <a:p>
             <a:fld id="{D2A48B96-639E-45A3-A0BA-2464DFDB1FAA}" type="datetimeFigureOut">
               <a:rPr lang="zh-CN" altLang="en-US" smtClean="0"/>
+              <a:t>2024/7/27</a:t>
             </a:fld>
             <a:endParaRPr lang="zh-CN" altLang="en-US"/>
           </a:p>
@@ -430,7 +438,6 @@
               <a:rPr lang="zh-CN" altLang="en-US" smtClean="0"/>
               <a:t>单击此处编辑母版文本样式</a:t>
             </a:r>
-            <a:endParaRPr lang="zh-CN" altLang="en-US" smtClean="0"/>
           </a:p>
           <a:p>
             <a:pPr lvl="1"/>
@@ -438,7 +445,6 @@
               <a:rPr lang="zh-CN" altLang="en-US" smtClean="0"/>
               <a:t>第二级</a:t>
             </a:r>
-            <a:endParaRPr lang="zh-CN" altLang="en-US" smtClean="0"/>
           </a:p>
           <a:p>
             <a:pPr lvl="2"/>
@@ -446,7 +452,6 @@
               <a:rPr lang="zh-CN" altLang="en-US" smtClean="0"/>
               <a:t>第三级</a:t>
             </a:r>
-            <a:endParaRPr lang="zh-CN" altLang="en-US" smtClean="0"/>
           </a:p>
           <a:p>
             <a:pPr lvl="3"/>
@@ -454,7 +459,6 @@
               <a:rPr lang="zh-CN" altLang="en-US" smtClean="0"/>
               <a:t>第四级</a:t>
             </a:r>
-            <a:endParaRPr lang="zh-CN" altLang="en-US" smtClean="0"/>
           </a:p>
           <a:p>
             <a:pPr lvl="4"/>
@@ -526,6 +530,7 @@
           <a:p>
             <a:fld id="{A6837353-30EB-4A48-80EB-173D804AEFBD}" type="slidenum">
               <a:rPr lang="zh-CN" altLang="en-US" smtClean="0"/>
+              <a:t>‹N°›</a:t>
             </a:fld>
             <a:endParaRPr lang="zh-CN" altLang="en-US"/>
           </a:p>
@@ -760,6 +765,7 @@
           <a:p>
             <a:fld id="{470D909C-314B-41A5-B1EB-A743A973ACF3}" type="datetimeFigureOut">
               <a:rPr lang="zh-CN" altLang="en-US" smtClean="0"/>
+              <a:t>2024/7/27</a:t>
             </a:fld>
             <a:endParaRPr lang="zh-CN" altLang="en-US"/>
           </a:p>
@@ -801,6 +807,7 @@
           <a:p>
             <a:fld id="{8955AB7F-6AF3-4DEE-BA13-872DAD2C9D21}" type="slidenum">
               <a:rPr lang="zh-CN" altLang="en-US" smtClean="0"/>
+              <a:t>‹N°›</a:t>
             </a:fld>
             <a:endParaRPr lang="zh-CN" altLang="en-US"/>
           </a:p>
@@ -874,7 +881,6 @@
               <a:rPr lang="zh-CN" altLang="en-US" smtClean="0"/>
               <a:t>单击此处编辑母版文本样式</a:t>
             </a:r>
-            <a:endParaRPr lang="zh-CN" altLang="en-US" smtClean="0"/>
           </a:p>
           <a:p>
             <a:pPr lvl="1"/>
@@ -882,7 +888,6 @@
               <a:rPr lang="zh-CN" altLang="en-US" smtClean="0"/>
               <a:t>第二级</a:t>
             </a:r>
-            <a:endParaRPr lang="zh-CN" altLang="en-US" smtClean="0"/>
           </a:p>
           <a:p>
             <a:pPr lvl="2"/>
@@ -890,7 +895,6 @@
               <a:rPr lang="zh-CN" altLang="en-US" smtClean="0"/>
               <a:t>第三级</a:t>
             </a:r>
-            <a:endParaRPr lang="zh-CN" altLang="en-US" smtClean="0"/>
           </a:p>
           <a:p>
             <a:pPr lvl="3"/>
@@ -898,7 +902,6 @@
               <a:rPr lang="zh-CN" altLang="en-US" smtClean="0"/>
               <a:t>第四级</a:t>
             </a:r>
-            <a:endParaRPr lang="zh-CN" altLang="en-US" smtClean="0"/>
           </a:p>
           <a:p>
             <a:pPr lvl="4"/>
@@ -927,6 +930,7 @@
           <a:p>
             <a:fld id="{470D909C-314B-41A5-B1EB-A743A973ACF3}" type="datetimeFigureOut">
               <a:rPr lang="zh-CN" altLang="en-US" smtClean="0"/>
+              <a:t>2024/7/27</a:t>
             </a:fld>
             <a:endParaRPr lang="zh-CN" altLang="en-US"/>
           </a:p>
@@ -968,6 +972,7 @@
           <a:p>
             <a:fld id="{8955AB7F-6AF3-4DEE-BA13-872DAD2C9D21}" type="slidenum">
               <a:rPr lang="zh-CN" altLang="en-US" smtClean="0"/>
+              <a:t>‹N°›</a:t>
             </a:fld>
             <a:endParaRPr lang="zh-CN" altLang="en-US"/>
           </a:p>
@@ -1051,7 +1056,6 @@
               <a:rPr lang="zh-CN" altLang="en-US" smtClean="0"/>
               <a:t>单击此处编辑母版文本样式</a:t>
             </a:r>
-            <a:endParaRPr lang="zh-CN" altLang="en-US" smtClean="0"/>
           </a:p>
           <a:p>
             <a:pPr lvl="1"/>
@@ -1059,7 +1063,6 @@
               <a:rPr lang="zh-CN" altLang="en-US" smtClean="0"/>
               <a:t>第二级</a:t>
             </a:r>
-            <a:endParaRPr lang="zh-CN" altLang="en-US" smtClean="0"/>
           </a:p>
           <a:p>
             <a:pPr lvl="2"/>
@@ -1067,7 +1070,6 @@
               <a:rPr lang="zh-CN" altLang="en-US" smtClean="0"/>
               <a:t>第三级</a:t>
             </a:r>
-            <a:endParaRPr lang="zh-CN" altLang="en-US" smtClean="0"/>
           </a:p>
           <a:p>
             <a:pPr lvl="3"/>
@@ -1075,7 +1077,6 @@
               <a:rPr lang="zh-CN" altLang="en-US" smtClean="0"/>
               <a:t>第四级</a:t>
             </a:r>
-            <a:endParaRPr lang="zh-CN" altLang="en-US" smtClean="0"/>
           </a:p>
           <a:p>
             <a:pPr lvl="4"/>
@@ -1104,6 +1105,7 @@
           <a:p>
             <a:fld id="{470D909C-314B-41A5-B1EB-A743A973ACF3}" type="datetimeFigureOut">
               <a:rPr lang="zh-CN" altLang="en-US" smtClean="0"/>
+              <a:t>2024/7/27</a:t>
             </a:fld>
             <a:endParaRPr lang="zh-CN" altLang="en-US"/>
           </a:p>
@@ -1145,6 +1147,7 @@
           <a:p>
             <a:fld id="{8955AB7F-6AF3-4DEE-BA13-872DAD2C9D21}" type="slidenum">
               <a:rPr lang="zh-CN" altLang="en-US" smtClean="0"/>
+              <a:t>‹N°›</a:t>
             </a:fld>
             <a:endParaRPr lang="zh-CN" altLang="en-US"/>
           </a:p>
@@ -1218,7 +1221,6 @@
               <a:rPr lang="zh-CN" altLang="en-US" smtClean="0"/>
               <a:t>单击此处编辑母版文本样式</a:t>
             </a:r>
-            <a:endParaRPr lang="zh-CN" altLang="en-US" smtClean="0"/>
           </a:p>
           <a:p>
             <a:pPr lvl="1"/>
@@ -1226,7 +1228,6 @@
               <a:rPr lang="zh-CN" altLang="en-US" smtClean="0"/>
               <a:t>第二级</a:t>
             </a:r>
-            <a:endParaRPr lang="zh-CN" altLang="en-US" smtClean="0"/>
           </a:p>
           <a:p>
             <a:pPr lvl="2"/>
@@ -1234,7 +1235,6 @@
               <a:rPr lang="zh-CN" altLang="en-US" smtClean="0"/>
               <a:t>第三级</a:t>
             </a:r>
-            <a:endParaRPr lang="zh-CN" altLang="en-US" smtClean="0"/>
           </a:p>
           <a:p>
             <a:pPr lvl="3"/>
@@ -1242,7 +1242,6 @@
               <a:rPr lang="zh-CN" altLang="en-US" smtClean="0"/>
               <a:t>第四级</a:t>
             </a:r>
-            <a:endParaRPr lang="zh-CN" altLang="en-US" smtClean="0"/>
           </a:p>
           <a:p>
             <a:pPr lvl="4"/>
@@ -1271,6 +1270,7 @@
           <a:p>
             <a:fld id="{470D909C-314B-41A5-B1EB-A743A973ACF3}" type="datetimeFigureOut">
               <a:rPr lang="zh-CN" altLang="en-US" smtClean="0"/>
+              <a:t>2024/7/27</a:t>
             </a:fld>
             <a:endParaRPr lang="zh-CN" altLang="en-US"/>
           </a:p>
@@ -1312,6 +1312,7 @@
           <a:p>
             <a:fld id="{8955AB7F-6AF3-4DEE-BA13-872DAD2C9D21}" type="slidenum">
               <a:rPr lang="zh-CN" altLang="en-US" smtClean="0"/>
+              <a:t>‹N°›</a:t>
             </a:fld>
             <a:endParaRPr lang="zh-CN" altLang="en-US"/>
           </a:p>
@@ -1490,7 +1491,6 @@
               <a:rPr lang="zh-CN" altLang="en-US" smtClean="0"/>
               <a:t>单击此处编辑母版文本样式</a:t>
             </a:r>
-            <a:endParaRPr lang="zh-CN" altLang="en-US" smtClean="0"/>
           </a:p>
         </p:txBody>
       </p:sp>
@@ -1511,6 +1511,7 @@
           <a:p>
             <a:fld id="{470D909C-314B-41A5-B1EB-A743A973ACF3}" type="datetimeFigureOut">
               <a:rPr lang="zh-CN" altLang="en-US" smtClean="0"/>
+              <a:t>2024/7/27</a:t>
             </a:fld>
             <a:endParaRPr lang="zh-CN" altLang="en-US"/>
           </a:p>
@@ -1552,6 +1553,7 @@
           <a:p>
             <a:fld id="{8955AB7F-6AF3-4DEE-BA13-872DAD2C9D21}" type="slidenum">
               <a:rPr lang="zh-CN" altLang="en-US" smtClean="0"/>
+              <a:t>‹N°›</a:t>
             </a:fld>
             <a:endParaRPr lang="zh-CN" altLang="en-US"/>
           </a:p>
@@ -1630,7 +1632,6 @@
               <a:rPr lang="zh-CN" altLang="en-US" smtClean="0"/>
               <a:t>单击此处编辑母版文本样式</a:t>
             </a:r>
-            <a:endParaRPr lang="zh-CN" altLang="en-US" smtClean="0"/>
           </a:p>
           <a:p>
             <a:pPr lvl="1"/>
@@ -1638,7 +1639,6 @@
               <a:rPr lang="zh-CN" altLang="en-US" smtClean="0"/>
               <a:t>第二级</a:t>
             </a:r>
-            <a:endParaRPr lang="zh-CN" altLang="en-US" smtClean="0"/>
           </a:p>
           <a:p>
             <a:pPr lvl="2"/>
@@ -1646,7 +1646,6 @@
               <a:rPr lang="zh-CN" altLang="en-US" smtClean="0"/>
               <a:t>第三级</a:t>
             </a:r>
-            <a:endParaRPr lang="zh-CN" altLang="en-US" smtClean="0"/>
           </a:p>
           <a:p>
             <a:pPr lvl="3"/>
@@ -1654,7 +1653,6 @@
               <a:rPr lang="zh-CN" altLang="en-US" smtClean="0"/>
               <a:t>第四级</a:t>
             </a:r>
-            <a:endParaRPr lang="zh-CN" altLang="en-US" smtClean="0"/>
           </a:p>
           <a:p>
             <a:pPr lvl="4"/>
@@ -1691,7 +1689,6 @@
               <a:rPr lang="zh-CN" altLang="en-US" smtClean="0"/>
               <a:t>单击此处编辑母版文本样式</a:t>
             </a:r>
-            <a:endParaRPr lang="zh-CN" altLang="en-US" smtClean="0"/>
           </a:p>
           <a:p>
             <a:pPr lvl="1"/>
@@ -1699,7 +1696,6 @@
               <a:rPr lang="zh-CN" altLang="en-US" smtClean="0"/>
               <a:t>第二级</a:t>
             </a:r>
-            <a:endParaRPr lang="zh-CN" altLang="en-US" smtClean="0"/>
           </a:p>
           <a:p>
             <a:pPr lvl="2"/>
@@ -1707,7 +1703,6 @@
               <a:rPr lang="zh-CN" altLang="en-US" smtClean="0"/>
               <a:t>第三级</a:t>
             </a:r>
-            <a:endParaRPr lang="zh-CN" altLang="en-US" smtClean="0"/>
           </a:p>
           <a:p>
             <a:pPr lvl="3"/>
@@ -1715,7 +1710,6 @@
               <a:rPr lang="zh-CN" altLang="en-US" smtClean="0"/>
               <a:t>第四级</a:t>
             </a:r>
-            <a:endParaRPr lang="zh-CN" altLang="en-US" smtClean="0"/>
           </a:p>
           <a:p>
             <a:pPr lvl="4"/>
@@ -1744,6 +1738,7 @@
           <a:p>
             <a:fld id="{470D909C-314B-41A5-B1EB-A743A973ACF3}" type="datetimeFigureOut">
               <a:rPr lang="zh-CN" altLang="en-US" smtClean="0"/>
+              <a:t>2024/7/27</a:t>
             </a:fld>
             <a:endParaRPr lang="zh-CN" altLang="en-US"/>
           </a:p>
@@ -1785,6 +1780,7 @@
           <a:p>
             <a:fld id="{8955AB7F-6AF3-4DEE-BA13-872DAD2C9D21}" type="slidenum">
               <a:rPr lang="zh-CN" altLang="en-US" smtClean="0"/>
+              <a:t>‹N°›</a:t>
             </a:fld>
             <a:endParaRPr lang="zh-CN" altLang="en-US"/>
           </a:p>
@@ -1905,7 +1901,6 @@
               <a:rPr lang="zh-CN" altLang="en-US" smtClean="0"/>
               <a:t>单击此处编辑母版文本样式</a:t>
             </a:r>
-            <a:endParaRPr lang="zh-CN" altLang="en-US" smtClean="0"/>
           </a:p>
         </p:txBody>
       </p:sp>
@@ -1934,7 +1929,6 @@
               <a:rPr lang="zh-CN" altLang="en-US" smtClean="0"/>
               <a:t>单击此处编辑母版文本样式</a:t>
             </a:r>
-            <a:endParaRPr lang="zh-CN" altLang="en-US" smtClean="0"/>
           </a:p>
           <a:p>
             <a:pPr lvl="1"/>
@@ -1942,7 +1936,6 @@
               <a:rPr lang="zh-CN" altLang="en-US" smtClean="0"/>
               <a:t>第二级</a:t>
             </a:r>
-            <a:endParaRPr lang="zh-CN" altLang="en-US" smtClean="0"/>
           </a:p>
           <a:p>
             <a:pPr lvl="2"/>
@@ -1950,7 +1943,6 @@
               <a:rPr lang="zh-CN" altLang="en-US" smtClean="0"/>
               <a:t>第三级</a:t>
             </a:r>
-            <a:endParaRPr lang="zh-CN" altLang="en-US" smtClean="0"/>
           </a:p>
           <a:p>
             <a:pPr lvl="3"/>
@@ -1958,7 +1950,6 @@
               <a:rPr lang="zh-CN" altLang="en-US" smtClean="0"/>
               <a:t>第四级</a:t>
             </a:r>
-            <a:endParaRPr lang="zh-CN" altLang="en-US" smtClean="0"/>
           </a:p>
           <a:p>
             <a:pPr lvl="4"/>
@@ -2032,7 +2023,6 @@
               <a:rPr lang="zh-CN" altLang="en-US" smtClean="0"/>
               <a:t>单击此处编辑母版文本样式</a:t>
             </a:r>
-            <a:endParaRPr lang="zh-CN" altLang="en-US" smtClean="0"/>
           </a:p>
         </p:txBody>
       </p:sp>
@@ -2061,7 +2051,6 @@
               <a:rPr lang="zh-CN" altLang="en-US" smtClean="0"/>
               <a:t>单击此处编辑母版文本样式</a:t>
             </a:r>
-            <a:endParaRPr lang="zh-CN" altLang="en-US" smtClean="0"/>
           </a:p>
           <a:p>
             <a:pPr lvl="1"/>
@@ -2069,7 +2058,6 @@
               <a:rPr lang="zh-CN" altLang="en-US" smtClean="0"/>
               <a:t>第二级</a:t>
             </a:r>
-            <a:endParaRPr lang="zh-CN" altLang="en-US" smtClean="0"/>
           </a:p>
           <a:p>
             <a:pPr lvl="2"/>
@@ -2077,7 +2065,6 @@
               <a:rPr lang="zh-CN" altLang="en-US" smtClean="0"/>
               <a:t>第三级</a:t>
             </a:r>
-            <a:endParaRPr lang="zh-CN" altLang="en-US" smtClean="0"/>
           </a:p>
           <a:p>
             <a:pPr lvl="3"/>
@@ -2085,7 +2072,6 @@
               <a:rPr lang="zh-CN" altLang="en-US" smtClean="0"/>
               <a:t>第四级</a:t>
             </a:r>
-            <a:endParaRPr lang="zh-CN" altLang="en-US" smtClean="0"/>
           </a:p>
           <a:p>
             <a:pPr lvl="4"/>
@@ -2114,6 +2100,7 @@
           <a:p>
             <a:fld id="{470D909C-314B-41A5-B1EB-A743A973ACF3}" type="datetimeFigureOut">
               <a:rPr lang="zh-CN" altLang="en-US" smtClean="0"/>
+              <a:t>2024/7/27</a:t>
             </a:fld>
             <a:endParaRPr lang="zh-CN" altLang="en-US"/>
           </a:p>
@@ -2155,6 +2142,7 @@
           <a:p>
             <a:fld id="{8955AB7F-6AF3-4DEE-BA13-872DAD2C9D21}" type="slidenum">
               <a:rPr lang="zh-CN" altLang="en-US" smtClean="0"/>
+              <a:t>‹N°›</a:t>
             </a:fld>
             <a:endParaRPr lang="zh-CN" altLang="en-US"/>
           </a:p>
@@ -2225,6 +2213,7 @@
           <a:p>
             <a:fld id="{470D909C-314B-41A5-B1EB-A743A973ACF3}" type="datetimeFigureOut">
               <a:rPr lang="zh-CN" altLang="en-US" smtClean="0"/>
+              <a:t>2024/7/27</a:t>
             </a:fld>
             <a:endParaRPr lang="zh-CN" altLang="en-US"/>
           </a:p>
@@ -2266,6 +2255,7 @@
           <a:p>
             <a:fld id="{8955AB7F-6AF3-4DEE-BA13-872DAD2C9D21}" type="slidenum">
               <a:rPr lang="zh-CN" altLang="en-US" smtClean="0"/>
+              <a:t>‹N°›</a:t>
             </a:fld>
             <a:endParaRPr lang="zh-CN" altLang="en-US"/>
           </a:p>
@@ -2313,6 +2303,7 @@
           <a:p>
             <a:fld id="{470D909C-314B-41A5-B1EB-A743A973ACF3}" type="datetimeFigureOut">
               <a:rPr lang="zh-CN" altLang="en-US" smtClean="0"/>
+              <a:t>2024/7/27</a:t>
             </a:fld>
             <a:endParaRPr lang="zh-CN" altLang="en-US"/>
           </a:p>
@@ -2354,6 +2345,7 @@
           <a:p>
             <a:fld id="{8955AB7F-6AF3-4DEE-BA13-872DAD2C9D21}" type="slidenum">
               <a:rPr lang="zh-CN" altLang="en-US" smtClean="0"/>
+              <a:t>‹N°›</a:t>
             </a:fld>
             <a:endParaRPr lang="zh-CN" altLang="en-US"/>
           </a:p>
@@ -2469,7 +2461,6 @@
               <a:rPr lang="zh-CN" altLang="en-US" smtClean="0"/>
               <a:t>单击此处编辑母版文本样式</a:t>
             </a:r>
-            <a:endParaRPr lang="zh-CN" altLang="en-US" smtClean="0"/>
           </a:p>
           <a:p>
             <a:pPr lvl="1"/>
@@ -2477,7 +2468,6 @@
               <a:rPr lang="zh-CN" altLang="en-US" smtClean="0"/>
               <a:t>第二级</a:t>
             </a:r>
-            <a:endParaRPr lang="zh-CN" altLang="en-US" smtClean="0"/>
           </a:p>
           <a:p>
             <a:pPr lvl="2"/>
@@ -2485,7 +2475,6 @@
               <a:rPr lang="zh-CN" altLang="en-US" smtClean="0"/>
               <a:t>第三级</a:t>
             </a:r>
-            <a:endParaRPr lang="zh-CN" altLang="en-US" smtClean="0"/>
           </a:p>
           <a:p>
             <a:pPr lvl="3"/>
@@ -2493,7 +2482,6 @@
               <a:rPr lang="zh-CN" altLang="en-US" smtClean="0"/>
               <a:t>第四级</a:t>
             </a:r>
-            <a:endParaRPr lang="zh-CN" altLang="en-US" smtClean="0"/>
           </a:p>
           <a:p>
             <a:pPr lvl="4"/>
@@ -2567,7 +2555,6 @@
               <a:rPr lang="zh-CN" altLang="en-US" smtClean="0"/>
               <a:t>单击此处编辑母版文本样式</a:t>
             </a:r>
-            <a:endParaRPr lang="zh-CN" altLang="en-US" smtClean="0"/>
           </a:p>
         </p:txBody>
       </p:sp>
@@ -2588,6 +2575,7 @@
           <a:p>
             <a:fld id="{470D909C-314B-41A5-B1EB-A743A973ACF3}" type="datetimeFigureOut">
               <a:rPr lang="zh-CN" altLang="en-US" smtClean="0"/>
+              <a:t>2024/7/27</a:t>
             </a:fld>
             <a:endParaRPr lang="zh-CN" altLang="en-US"/>
           </a:p>
@@ -2629,6 +2617,7 @@
           <a:p>
             <a:fld id="{8955AB7F-6AF3-4DEE-BA13-872DAD2C9D21}" type="slidenum">
               <a:rPr lang="zh-CN" altLang="en-US" smtClean="0"/>
+              <a:t>‹N°›</a:t>
             </a:fld>
             <a:endParaRPr lang="zh-CN" altLang="en-US"/>
           </a:p>
@@ -2814,7 +2803,6 @@
               <a:rPr lang="zh-CN" altLang="en-US" smtClean="0"/>
               <a:t>单击此处编辑母版文本样式</a:t>
             </a:r>
-            <a:endParaRPr lang="zh-CN" altLang="en-US" smtClean="0"/>
           </a:p>
         </p:txBody>
       </p:sp>
@@ -2835,6 +2823,7 @@
           <a:p>
             <a:fld id="{470D909C-314B-41A5-B1EB-A743A973ACF3}" type="datetimeFigureOut">
               <a:rPr lang="zh-CN" altLang="en-US" smtClean="0"/>
+              <a:t>2024/7/27</a:t>
             </a:fld>
             <a:endParaRPr lang="zh-CN" altLang="en-US"/>
           </a:p>
@@ -2876,6 +2865,7 @@
           <a:p>
             <a:fld id="{8955AB7F-6AF3-4DEE-BA13-872DAD2C9D21}" type="slidenum">
               <a:rPr lang="zh-CN" altLang="en-US" smtClean="0"/>
+              <a:t>‹N°›</a:t>
             </a:fld>
             <a:endParaRPr lang="zh-CN" altLang="en-US"/>
           </a:p>
@@ -2974,7 +2964,6 @@
               <a:rPr lang="zh-CN" altLang="en-US" smtClean="0"/>
               <a:t>单击此处编辑母版文本样式</a:t>
             </a:r>
-            <a:endParaRPr lang="zh-CN" altLang="en-US" smtClean="0"/>
           </a:p>
           <a:p>
             <a:pPr lvl="1"/>
@@ -2982,7 +2971,6 @@
               <a:rPr lang="zh-CN" altLang="en-US" smtClean="0"/>
               <a:t>第二级</a:t>
             </a:r>
-            <a:endParaRPr lang="zh-CN" altLang="en-US" smtClean="0"/>
           </a:p>
           <a:p>
             <a:pPr lvl="2"/>
@@ -2990,7 +2978,6 @@
               <a:rPr lang="zh-CN" altLang="en-US" smtClean="0"/>
               <a:t>第三级</a:t>
             </a:r>
-            <a:endParaRPr lang="zh-CN" altLang="en-US" smtClean="0"/>
           </a:p>
           <a:p>
             <a:pPr lvl="3"/>
@@ -2998,7 +2985,6 @@
               <a:rPr lang="zh-CN" altLang="en-US" smtClean="0"/>
               <a:t>第四级</a:t>
             </a:r>
-            <a:endParaRPr lang="zh-CN" altLang="en-US" smtClean="0"/>
           </a:p>
           <a:p>
             <a:pPr lvl="4"/>
@@ -3045,6 +3031,7 @@
           <a:p>
             <a:fld id="{470D909C-314B-41A5-B1EB-A743A973ACF3}" type="datetimeFigureOut">
               <a:rPr lang="zh-CN" altLang="en-US" smtClean="0"/>
+              <a:t>2024/7/27</a:t>
             </a:fld>
             <a:endParaRPr lang="zh-CN" altLang="en-US"/>
           </a:p>
@@ -3122,6 +3109,7 @@
           <a:p>
             <a:fld id="{8955AB7F-6AF3-4DEE-BA13-872DAD2C9D21}" type="slidenum">
               <a:rPr lang="zh-CN" altLang="en-US" smtClean="0"/>
+              <a:t>‹N°›</a:t>
             </a:fld>
             <a:endParaRPr lang="zh-CN" altLang="en-US"/>
           </a:p>
@@ -3452,7 +3440,7 @@
           <p:nvPr/>
         </p:nvPicPr>
         <p:blipFill>
-          <a:blip r:embed="rId1">
+          <a:blip r:embed="rId2">
             <a:extLst>
               <a:ext uri="{28A0092B-C50C-407E-A947-70E740481C1C}">
                 <a14:useLocalDpi xmlns:a14="http://schemas.microsoft.com/office/drawing/2010/main" val="0"/>
@@ -3833,11 +3821,6 @@
               </a:rPr>
               <a:t>Sciences des données au Féminin en Afrique : Cohorte 2</a:t>
             </a:r>
-            <a:endParaRPr lang="fr-FR" altLang="zh-CN" b="1" dirty="0" smtClean="0">
-              <a:latin typeface="Times New Roman" panose="02020603050405020304" charset="0"/>
-              <a:ea typeface="Calibri" panose="020F0502020204030204" pitchFamily="34" charset="0"/>
-              <a:cs typeface="Times New Roman" panose="02020603050405020304" charset="0"/>
-            </a:endParaRPr>
           </a:p>
           <a:p>
             <a:pPr algn="l"/>
@@ -3867,21 +3850,8 @@
                 <a:ea typeface="Calibri" panose="020F0502020204030204" pitchFamily="34" charset="0"/>
                 <a:cs typeface="Times New Roman" panose="02020603050405020304" charset="0"/>
               </a:rPr>
-              <a:t> : Khady Mame Diarra </a:t>
-            </a:r>
-            <a:r>
-              <a:rPr lang="fr-FR" altLang="zh-CN" b="1" dirty="0" smtClean="0">
-                <a:latin typeface="Times New Roman" panose="02020603050405020304" charset="0"/>
-                <a:ea typeface="Calibri" panose="020F0502020204030204" pitchFamily="34" charset="0"/>
-                <a:cs typeface="Times New Roman" panose="02020603050405020304" charset="0"/>
-              </a:rPr>
-              <a:t>SENE</a:t>
-            </a:r>
-            <a:endParaRPr lang="fr-FR" altLang="zh-CN" b="1" dirty="0" smtClean="0">
-              <a:latin typeface="Times New Roman" panose="02020603050405020304" charset="0"/>
-              <a:ea typeface="Calibri" panose="020F0502020204030204" pitchFamily="34" charset="0"/>
-              <a:cs typeface="Times New Roman" panose="02020603050405020304" charset="0"/>
-            </a:endParaRPr>
+              <a:t> : Khady Mame Diarra SENE</a:t>
+            </a:r>
           </a:p>
           <a:p>
             <a:pPr algn="just">
@@ -3937,11 +3907,6 @@
               </a:rPr>
               <a:t> DIENG</a:t>
             </a:r>
-            <a:endParaRPr lang="fr-FR" altLang="zh-CN" b="1" dirty="0" smtClean="0">
-              <a:latin typeface="Times New Roman" panose="02020603050405020304" charset="0"/>
-              <a:ea typeface="Calibri" panose="020F0502020204030204" pitchFamily="34" charset="0"/>
-              <a:cs typeface="Times New Roman" panose="02020603050405020304" charset="0"/>
-            </a:endParaRPr>
           </a:p>
           <a:p>
             <a:pPr algn="just">
@@ -3965,11 +3930,6 @@
               </a:rPr>
               <a:t>	     Hermione DENAKPO</a:t>
             </a:r>
-            <a:endParaRPr lang="fr-FR" altLang="zh-CN" b="1" dirty="0" smtClean="0">
-              <a:latin typeface="Times New Roman" panose="02020603050405020304" charset="0"/>
-              <a:ea typeface="Calibri" panose="020F0502020204030204" pitchFamily="34" charset="0"/>
-              <a:cs typeface="Times New Roman" panose="02020603050405020304" charset="0"/>
-            </a:endParaRPr>
           </a:p>
           <a:p>
             <a:pPr algn="just">
@@ -3993,11 +3953,6 @@
               </a:rPr>
               <a:t>	     Ayawavi Delali Irène EDOH</a:t>
             </a:r>
-            <a:endParaRPr lang="fr-FR" altLang="zh-CN" b="1" dirty="0" smtClean="0">
-              <a:latin typeface="Times New Roman" panose="02020603050405020304" charset="0"/>
-              <a:ea typeface="Calibri" panose="020F0502020204030204" pitchFamily="34" charset="0"/>
-              <a:cs typeface="Times New Roman" panose="02020603050405020304" charset="0"/>
-            </a:endParaRPr>
           </a:p>
         </p:txBody>
       </p:sp>
@@ -4010,7 +3965,7 @@
           <p:nvPr/>
         </p:nvPicPr>
         <p:blipFill>
-          <a:blip r:embed="rId2"/>
+          <a:blip r:embed="rId3"/>
           <a:stretch>
             <a:fillRect/>
           </a:stretch>
@@ -4142,7 +4097,7 @@
           <p:nvPr/>
         </p:nvPicPr>
         <p:blipFill>
-          <a:blip r:embed="rId1"/>
+          <a:blip r:embed="rId2"/>
           <a:stretch>
             <a:fillRect/>
           </a:stretch>
@@ -4248,28 +4203,6 @@
               </a:rPr>
               <a:t>    </a:t>
             </a:r>
-            <a:endParaRPr lang="fr-FR" altLang="zh-CN" sz="4800" b="1" dirty="0">
-              <a:ln w="12700" cmpd="sng">
-                <a:noFill/>
-                <a:prstDash val="solid"/>
-              </a:ln>
-              <a:solidFill>
-                <a:schemeClr val="bg1"/>
-              </a:solidFill>
-              <a:effectLst>
-                <a:outerShdw blurRad="38100" dist="38100" dir="2700000" algn="tl">
-                  <a:srgbClr val="000000">
-                    <a:alpha val="43137"/>
-                  </a:srgbClr>
-                </a:outerShdw>
-              </a:effectLst>
-              <a:highlight>
-                <a:srgbClr val="000080"/>
-              </a:highlight>
-              <a:latin typeface="Times New Roman" panose="02020603050405020304" charset="0"/>
-              <a:ea typeface="Calibri" panose="020F0502020204030204" pitchFamily="34" charset="0"/>
-              <a:cs typeface="Times New Roman" panose="02020603050405020304" charset="0"/>
-            </a:endParaRPr>
           </a:p>
         </p:txBody>
       </p:sp>
@@ -4282,7 +4215,7 @@
           <p:nvPr/>
         </p:nvPicPr>
         <p:blipFill>
-          <a:blip r:embed="rId2"/>
+          <a:blip r:embed="rId3"/>
           <a:stretch>
             <a:fillRect/>
           </a:stretch>
@@ -4353,10 +4286,6 @@
               </a:rPr>
               <a:t>Tableau de bord</a:t>
             </a:r>
-            <a:endParaRPr lang="fr-FR" altLang="en-US" sz="2800" dirty="0">
-              <a:latin typeface="Times New Roman" panose="02020603050405020304" charset="0"/>
-              <a:cs typeface="Times New Roman" panose="02020603050405020304" charset="0"/>
-            </a:endParaRPr>
           </a:p>
         </p:txBody>
       </p:sp>
@@ -4411,10 +4340,6 @@
               </a:rPr>
               <a:t>Rapport Technique</a:t>
             </a:r>
-            <a:endParaRPr lang="fr-FR" altLang="en-US" sz="2800" dirty="0">
-              <a:latin typeface="Times New Roman" panose="02020603050405020304" charset="0"/>
-              <a:cs typeface="Times New Roman" panose="02020603050405020304" charset="0"/>
-            </a:endParaRPr>
           </a:p>
         </p:txBody>
       </p:sp>
@@ -4458,13 +4383,13 @@
   <p:clrMapOvr>
     <a:masterClrMapping/>
   </p:clrMapOvr>
-  <mc:AlternateContent xmlns:mc="http://schemas.openxmlformats.org/markup-compatibility/2006">
-    <mc:Choice xmlns:p15="http://schemas.microsoft.com/office/powerpoint/2012/main" Requires="p15">
-      <p:transition xmlns:p14="http://schemas.microsoft.com/office/powerpoint/2010/main" spd="slow" Requires="p14" p14:dur="1250">
+  <mc:AlternateContent xmlns:mc="http://schemas.openxmlformats.org/markup-compatibility/2006" xmlns:p15="http://schemas.microsoft.com/office/powerpoint/2012/main">
+    <mc:Choice Requires="p15">
+      <p:transition xmlns:p14="http://schemas.microsoft.com/office/powerpoint/2010/main" spd="slow" p14:dur="1250">
         <p15:prstTrans prst="pageCurlDouble"/>
       </p:transition>
     </mc:Choice>
-    <mc:Fallback>
+    <mc:Fallback xmlns="">
       <p:transition spd="slow">
         <p:fade/>
       </p:transition>
@@ -4539,32 +4464,7 @@
                 <a:ea typeface="Calibri" panose="020F0502020204030204" pitchFamily="34" charset="0"/>
                 <a:cs typeface="Times New Roman" panose="02020603050405020304" charset="0"/>
               </a:rPr>
-              <a:t>Déroulement du projet</a:t>
-            </a:r>
-            <a:r>
-              <a:rPr lang="fr-FR" altLang="zh-CN" sz="4800" b="1" dirty="0" smtClean="0">
-                <a:ln w="12700" cmpd="sng">
-                  <a:noFill/>
-                  <a:prstDash val="solid"/>
-                </a:ln>
-                <a:solidFill>
-                  <a:schemeClr val="bg1"/>
-                </a:solidFill>
-                <a:effectLst>
-                  <a:outerShdw blurRad="38100" dist="38100" dir="2700000" algn="tl">
-                    <a:srgbClr val="000000">
-                      <a:alpha val="43137"/>
-                    </a:srgbClr>
-                  </a:outerShdw>
-                </a:effectLst>
-                <a:highlight>
-                  <a:srgbClr val="000080"/>
-                </a:highlight>
-                <a:latin typeface="Times New Roman" panose="02020603050405020304" charset="0"/>
-                <a:ea typeface="Calibri" panose="020F0502020204030204" pitchFamily="34" charset="0"/>
-                <a:cs typeface="Times New Roman" panose="02020603050405020304" charset="0"/>
-              </a:rPr>
-              <a:t>    </a:t>
+              <a:t>Déroulement du projet    </a:t>
             </a:r>
             <a:endParaRPr lang="fr-FR" altLang="zh-CN" sz="4800" b="1" dirty="0">
               <a:ln w="12700" cmpd="sng">
@@ -4740,7 +4640,7 @@
           <p:nvPr/>
         </p:nvPicPr>
         <p:blipFill>
-          <a:blip r:embed="rId1"/>
+          <a:blip r:embed="rId2"/>
           <a:stretch>
             <a:fillRect/>
           </a:stretch>
@@ -4991,9 +4891,6 @@
               </a:rPr>
               <a:t>4</a:t>
             </a:r>
-            <a:endParaRPr lang="fr-FR" sz="4000" b="1" dirty="0">
-              <a:latin typeface="Georgia" panose="02040502050405020303" pitchFamily="18" charset="0"/>
-            </a:endParaRPr>
           </a:p>
         </p:txBody>
       </p:sp>
@@ -5042,9 +4939,6 @@
               </a:rPr>
               <a:t>3</a:t>
             </a:r>
-            <a:endParaRPr lang="fr-FR" sz="4000" b="1" dirty="0">
-              <a:latin typeface="Georgia" panose="02040502050405020303" pitchFamily="18" charset="0"/>
-            </a:endParaRPr>
           </a:p>
         </p:txBody>
       </p:sp>
@@ -5136,7 +5030,7 @@
           <p:nvPr/>
         </p:nvPicPr>
         <p:blipFill>
-          <a:blip r:embed="rId1">
+          <a:blip r:embed="rId2">
             <a:extLst>
               <a:ext uri="{28A0092B-C50C-407E-A947-70E740481C1C}">
                 <a14:useLocalDpi xmlns:a14="http://schemas.microsoft.com/office/drawing/2010/main" val="0"/>
@@ -5191,14 +5085,6 @@
               </a:rPr>
               <a:t>THANK YOU</a:t>
             </a:r>
-            <a:endParaRPr lang="en-US" sz="9600" b="1" dirty="0">
-              <a:solidFill>
-                <a:schemeClr val="bg1"/>
-              </a:solidFill>
-              <a:latin typeface="Times New Roman" panose="02020603050405020304" charset="0"/>
-              <a:ea typeface="Calibri" panose="020F0502020204030204" pitchFamily="34" charset="0"/>
-              <a:cs typeface="Times New Roman" panose="02020603050405020304" charset="0"/>
-            </a:endParaRPr>
           </a:p>
         </p:txBody>
       </p:sp>
@@ -5398,10 +5284,6 @@
               </a:rPr>
               <a:t>Sciences des données au Féminin  en Afrique</a:t>
             </a:r>
-            <a:endParaRPr lang="fr-FR" altLang="en-US" sz="1800" b="1" dirty="0">
-              <a:latin typeface="Times New Roman" panose="02020603050405020304" charset="0"/>
-              <a:cs typeface="Times New Roman" panose="02020603050405020304" charset="0"/>
-            </a:endParaRPr>
           </a:p>
         </p:txBody>
       </p:sp>
@@ -5410,13 +5292,13 @@
   <p:clrMapOvr>
     <a:masterClrMapping/>
   </p:clrMapOvr>
-  <mc:AlternateContent xmlns:mc="http://schemas.openxmlformats.org/markup-compatibility/2006">
-    <mc:Choice xmlns:p14="http://schemas.microsoft.com/office/powerpoint/2010/main" Requires="p14">
+  <mc:AlternateContent xmlns:mc="http://schemas.openxmlformats.org/markup-compatibility/2006" xmlns:p14="http://schemas.microsoft.com/office/powerpoint/2010/main">
+    <mc:Choice Requires="p14">
       <p:transition spd="slow" p14:dur="1200">
         <p14:doors dir="vert"/>
       </p:transition>
     </mc:Choice>
-    <mc:Fallback>
+    <mc:Fallback xmlns="">
       <p:transition spd="slow">
         <p:fade/>
       </p:transition>
@@ -5451,7 +5333,7 @@
           <p:nvPr/>
         </p:nvPicPr>
         <p:blipFill>
-          <a:blip r:embed="rId1">
+          <a:blip r:embed="rId2">
             <a:extLst>
               <a:ext uri="{28A0092B-C50C-407E-A947-70E740481C1C}">
                 <a14:useLocalDpi xmlns:a14="http://schemas.microsoft.com/office/drawing/2010/main" val="0"/>
@@ -5709,14 +5591,6 @@
               </a:rPr>
               <a:t>par les populations, l’objectif de cette étude est de mettre en confluence plusieurs paramètres afin de déterminer les facteurs physiques ou humains ayant une influence directe ou indirecte sur l’augmentation des inondations.</a:t>
             </a:r>
-            <a:endParaRPr lang="zh-CN" altLang="en-US" sz="3100" b="1" dirty="0">
-              <a:solidFill>
-                <a:schemeClr val="bg1"/>
-              </a:solidFill>
-              <a:latin typeface="Times New Roman" panose="02020603050405020304" charset="0"/>
-              <a:ea typeface="Calibri" panose="020F0502020204030204" pitchFamily="34" charset="0"/>
-              <a:cs typeface="Times New Roman" panose="02020603050405020304" charset="0"/>
-            </a:endParaRPr>
           </a:p>
         </p:txBody>
       </p:sp>
@@ -5775,28 +5649,6 @@
               </a:rPr>
               <a:t>Bref résumé du projet.</a:t>
             </a:r>
-            <a:endParaRPr lang="fr-FR" altLang="zh-CN" sz="4800" b="1" dirty="0">
-              <a:ln w="12700" cmpd="sng">
-                <a:noFill/>
-                <a:prstDash val="solid"/>
-              </a:ln>
-              <a:solidFill>
-                <a:schemeClr val="tx1"/>
-              </a:solidFill>
-              <a:effectLst>
-                <a:outerShdw blurRad="38100" dist="38100" dir="2700000" algn="tl">
-                  <a:srgbClr val="000000">
-                    <a:alpha val="43137"/>
-                  </a:srgbClr>
-                </a:outerShdw>
-              </a:effectLst>
-              <a:highlight>
-                <a:srgbClr val="FF0000"/>
-              </a:highlight>
-              <a:latin typeface="Times New Roman" panose="02020603050405020304" charset="0"/>
-              <a:ea typeface="Calibri" panose="020F0502020204030204" pitchFamily="34" charset="0"/>
-              <a:cs typeface="Times New Roman" panose="02020603050405020304" charset="0"/>
-            </a:endParaRPr>
           </a:p>
         </p:txBody>
       </p:sp>
@@ -5917,7 +5769,7 @@
           <p:nvPr/>
         </p:nvPicPr>
         <p:blipFill>
-          <a:blip r:embed="rId1">
+          <a:blip r:embed="rId2">
             <a:extLst>
               <a:ext uri="{28A0092B-C50C-407E-A947-70E740481C1C}">
                 <a14:useLocalDpi xmlns:a14="http://schemas.microsoft.com/office/drawing/2010/main" val="0"/>
@@ -5984,14 +5836,6 @@
               </a:rPr>
               <a:t>Le choix de la zone se justifie par plusieurs raison :</a:t>
             </a:r>
-            <a:endParaRPr lang="fr-FR" altLang="zh-CN" sz="3100" b="1" dirty="0" smtClean="0">
-              <a:solidFill>
-                <a:schemeClr val="bg1"/>
-              </a:solidFill>
-              <a:latin typeface="Times New Roman" panose="02020603050405020304" charset="0"/>
-              <a:ea typeface="Calibri" panose="020F0502020204030204" pitchFamily="34" charset="0"/>
-              <a:cs typeface="Times New Roman" panose="02020603050405020304" charset="0"/>
-            </a:endParaRPr>
           </a:p>
           <a:p>
             <a:pPr marL="457200" indent="-457200" algn="just">
@@ -6012,14 +5856,6 @@
               </a:rPr>
               <a:t>Situation géographique de la zone.</a:t>
             </a:r>
-            <a:endParaRPr lang="fr-FR" altLang="zh-CN" sz="3100" b="1" dirty="0" smtClean="0">
-              <a:solidFill>
-                <a:schemeClr val="bg1"/>
-              </a:solidFill>
-              <a:latin typeface="Times New Roman" panose="02020603050405020304" charset="0"/>
-              <a:ea typeface="Calibri" panose="020F0502020204030204" pitchFamily="34" charset="0"/>
-              <a:cs typeface="Times New Roman" panose="02020603050405020304" charset="0"/>
-            </a:endParaRPr>
           </a:p>
           <a:p>
             <a:pPr marL="457200" indent="-457200" algn="just">
@@ -6040,14 +5876,6 @@
               </a:rPr>
               <a:t>Précarité notée.</a:t>
             </a:r>
-            <a:endParaRPr lang="fr-FR" altLang="zh-CN" sz="3100" b="1" dirty="0" smtClean="0">
-              <a:solidFill>
-                <a:schemeClr val="bg1"/>
-              </a:solidFill>
-              <a:latin typeface="Times New Roman" panose="02020603050405020304" charset="0"/>
-              <a:ea typeface="Calibri" panose="020F0502020204030204" pitchFamily="34" charset="0"/>
-              <a:cs typeface="Times New Roman" panose="02020603050405020304" charset="0"/>
-            </a:endParaRPr>
           </a:p>
           <a:p>
             <a:pPr marL="457200" indent="-457200" algn="just">
@@ -6068,14 +5896,6 @@
               </a:rPr>
               <a:t>Problématique liées aux inondations.</a:t>
             </a:r>
-            <a:endParaRPr lang="fr-FR" altLang="zh-CN" sz="3100" b="1" dirty="0" smtClean="0">
-              <a:solidFill>
-                <a:schemeClr val="bg1"/>
-              </a:solidFill>
-              <a:latin typeface="Times New Roman" panose="02020603050405020304" charset="0"/>
-              <a:ea typeface="Calibri" panose="020F0502020204030204" pitchFamily="34" charset="0"/>
-              <a:cs typeface="Times New Roman" panose="02020603050405020304" charset="0"/>
-            </a:endParaRPr>
           </a:p>
           <a:p>
             <a:pPr marL="457200" indent="-457200" algn="just">
@@ -6096,14 +5916,6 @@
               </a:rPr>
               <a:t>Manque de politique d’assainissement.</a:t>
             </a:r>
-            <a:endParaRPr lang="fr-FR" altLang="zh-CN" sz="3100" b="1" dirty="0" smtClean="0">
-              <a:solidFill>
-                <a:schemeClr val="bg1"/>
-              </a:solidFill>
-              <a:latin typeface="Times New Roman" panose="02020603050405020304" charset="0"/>
-              <a:ea typeface="Calibri" panose="020F0502020204030204" pitchFamily="34" charset="0"/>
-              <a:cs typeface="Times New Roman" panose="02020603050405020304" charset="0"/>
-            </a:endParaRPr>
           </a:p>
           <a:p>
             <a:pPr algn="just">
@@ -6409,7 +6221,7 @@
           <p:nvPr/>
         </p:nvPicPr>
         <p:blipFill>
-          <a:blip r:embed="rId1">
+          <a:blip r:embed="rId2">
             <a:extLst>
               <a:ext uri="{28A0092B-C50C-407E-A947-70E740481C1C}">
                 <a14:useLocalDpi xmlns:a14="http://schemas.microsoft.com/office/drawing/2010/main" val="0"/>
@@ -6482,25 +6294,6 @@
               </a:rPr>
               <a:t>Présentation de la zone</a:t>
             </a:r>
-            <a:endParaRPr lang="fr-FR" altLang="zh-CN" sz="4800" b="1" dirty="0">
-              <a:ln w="12700" cmpd="sng">
-                <a:noFill/>
-                <a:prstDash val="solid"/>
-              </a:ln>
-              <a:solidFill>
-                <a:schemeClr val="bg1"/>
-              </a:solidFill>
-              <a:effectLst>
-                <a:outerShdw blurRad="38100" dist="38100" dir="2700000" algn="tl">
-                  <a:srgbClr val="000000">
-                    <a:alpha val="43137"/>
-                  </a:srgbClr>
-                </a:outerShdw>
-              </a:effectLst>
-              <a:latin typeface="Times New Roman" panose="02020603050405020304" charset="0"/>
-              <a:ea typeface="Calibri" panose="020F0502020204030204" pitchFamily="34" charset="0"/>
-              <a:cs typeface="Times New Roman" panose="02020603050405020304" charset="0"/>
-            </a:endParaRPr>
           </a:p>
         </p:txBody>
       </p:sp>
@@ -6513,7 +6306,7 @@
           <p:nvPr/>
         </p:nvPicPr>
         <p:blipFill>
-          <a:blip r:embed="rId2"/>
+          <a:blip r:embed="rId3"/>
           <a:stretch>
             <a:fillRect/>
           </a:stretch>
@@ -6537,7 +6330,7 @@
           <p:nvPr/>
         </p:nvPicPr>
         <p:blipFill>
-          <a:blip r:embed="rId3"/>
+          <a:blip r:embed="rId4"/>
           <a:stretch>
             <a:fillRect/>
           </a:stretch>
@@ -6561,7 +6354,7 @@
           <p:nvPr/>
         </p:nvPicPr>
         <p:blipFill>
-          <a:blip r:embed="rId3"/>
+          <a:blip r:embed="rId4"/>
           <a:stretch>
             <a:fillRect/>
           </a:stretch>
@@ -6585,7 +6378,7 @@
           <p:nvPr/>
         </p:nvPicPr>
         <p:blipFill>
-          <a:blip r:embed="rId4"/>
+          <a:blip r:embed="rId5"/>
           <a:stretch>
             <a:fillRect/>
           </a:stretch>
@@ -6609,7 +6402,7 @@
           <p:nvPr/>
         </p:nvPicPr>
         <p:blipFill>
-          <a:blip r:embed="rId5"/>
+          <a:blip r:embed="rId6"/>
           <a:stretch>
             <a:fillRect/>
           </a:stretch>
@@ -6633,7 +6426,7 @@
           <p:nvPr/>
         </p:nvPicPr>
         <p:blipFill>
-          <a:blip r:embed="rId6"/>
+          <a:blip r:embed="rId7"/>
           <a:stretch>
             <a:fillRect/>
           </a:stretch>
@@ -6910,7 +6703,7 @@
           <p:nvPr/>
         </p:nvPicPr>
         <p:blipFill>
-          <a:blip r:embed="rId1">
+          <a:blip r:embed="rId2">
             <a:extLst>
               <a:ext uri="{28A0092B-C50C-407E-A947-70E740481C1C}">
                 <a14:useLocalDpi xmlns:a14="http://schemas.microsoft.com/office/drawing/2010/main" val="0"/>
@@ -6977,14 +6770,6 @@
               </a:rPr>
               <a:t>Cette étude se fera à travers différents paramètres tel que :</a:t>
             </a:r>
-            <a:endParaRPr lang="fr-FR" altLang="zh-CN" sz="3100" b="1" dirty="0" smtClean="0">
-              <a:solidFill>
-                <a:schemeClr val="bg1"/>
-              </a:solidFill>
-              <a:latin typeface="Times New Roman" panose="02020603050405020304" charset="0"/>
-              <a:ea typeface="Calibri" panose="020F0502020204030204" pitchFamily="34" charset="0"/>
-              <a:cs typeface="Times New Roman" panose="02020603050405020304" charset="0"/>
-            </a:endParaRPr>
           </a:p>
           <a:p>
             <a:pPr marL="457200" indent="-457200" algn="just">
@@ -7068,14 +6853,6 @@
               </a:rPr>
               <a:t>) SRTM. </a:t>
             </a:r>
-            <a:endParaRPr lang="fr-FR" altLang="zh-CN" sz="3100" b="1" dirty="0" smtClean="0">
-              <a:solidFill>
-                <a:schemeClr val="bg1"/>
-              </a:solidFill>
-              <a:latin typeface="Times New Roman" panose="02020603050405020304" charset="0"/>
-              <a:ea typeface="Calibri" panose="020F0502020204030204" pitchFamily="34" charset="0"/>
-              <a:cs typeface="Times New Roman" panose="02020603050405020304" charset="0"/>
-            </a:endParaRPr>
           </a:p>
           <a:p>
             <a:pPr algn="just"/>
@@ -7181,14 +6958,6 @@
               </a:rPr>
               <a:t>). </a:t>
             </a:r>
-            <a:endParaRPr lang="fr-FR" altLang="zh-CN" sz="3100" b="1" dirty="0" smtClean="0">
-              <a:solidFill>
-                <a:schemeClr val="bg1"/>
-              </a:solidFill>
-              <a:latin typeface="Times New Roman" panose="02020603050405020304" charset="0"/>
-              <a:ea typeface="Calibri" panose="020F0502020204030204" pitchFamily="34" charset="0"/>
-              <a:cs typeface="Times New Roman" panose="02020603050405020304" charset="0"/>
-            </a:endParaRPr>
           </a:p>
         </p:txBody>
       </p:sp>
@@ -7384,7 +7153,7 @@
           <p:nvPr/>
         </p:nvPicPr>
         <p:blipFill>
-          <a:blip r:embed="rId1">
+          <a:blip r:embed="rId2">
             <a:extLst>
               <a:ext uri="{28A0092B-C50C-407E-A947-70E740481C1C}">
                 <a14:useLocalDpi xmlns:a14="http://schemas.microsoft.com/office/drawing/2010/main" val="0"/>
@@ -7539,14 +7308,6 @@
               </a:rPr>
               <a:t>et de savoir les zones d’urgences qui ont le plus besoin d’aide.</a:t>
             </a:r>
-            <a:endParaRPr lang="fr-FR" altLang="zh-CN" sz="3100" b="1" dirty="0" smtClean="0">
-              <a:solidFill>
-                <a:schemeClr val="bg1"/>
-              </a:solidFill>
-              <a:latin typeface="Times New Roman" panose="02020603050405020304" charset="0"/>
-              <a:ea typeface="Calibri" panose="020F0502020204030204" pitchFamily="34" charset="0"/>
-              <a:cs typeface="Times New Roman" panose="02020603050405020304" charset="0"/>
-            </a:endParaRPr>
           </a:p>
           <a:p>
             <a:pPr marL="457200" indent="-457200" algn="just">
@@ -7619,14 +7380,6 @@
               </a:rPr>
               <a:t>et de savoir comment est ce que la population s’est augmentée durant ces années. Cette partie se fera suivant une analyse spatiale mais aussi par des études statistiques,</a:t>
             </a:r>
-            <a:endParaRPr lang="fr-FR" altLang="zh-CN" sz="3100" b="1" dirty="0" smtClean="0">
-              <a:solidFill>
-                <a:schemeClr val="bg1"/>
-              </a:solidFill>
-              <a:latin typeface="Times New Roman" panose="02020603050405020304" charset="0"/>
-              <a:ea typeface="Calibri" panose="020F0502020204030204" pitchFamily="34" charset="0"/>
-              <a:cs typeface="Times New Roman" panose="02020603050405020304" charset="0"/>
-            </a:endParaRPr>
           </a:p>
           <a:p>
             <a:pPr marL="457200" indent="-457200" algn="just">
@@ -7835,7 +7588,7 @@
           <p:nvPr/>
         </p:nvPicPr>
         <p:blipFill>
-          <a:blip r:embed="rId1">
+          <a:blip r:embed="rId2">
             <a:extLst>
               <a:ext uri="{28A0092B-C50C-407E-A947-70E740481C1C}">
                 <a14:useLocalDpi xmlns:a14="http://schemas.microsoft.com/office/drawing/2010/main" val="0"/>
@@ -7908,14 +7661,6 @@
               </a:rPr>
               <a:t>Pour le traitement des données, il est également prévu d'automatiser certaines tâches avec R afin de déceler les zones susceptibles d'être inondées. Cela se fera en utilisant les points collectés, qui serviront d'échantillons.</a:t>
             </a:r>
-            <a:endParaRPr lang="fr-FR" altLang="zh-CN" sz="3100" b="1" dirty="0" smtClean="0">
-              <a:solidFill>
-                <a:schemeClr val="bg1"/>
-              </a:solidFill>
-              <a:latin typeface="Times New Roman" panose="02020603050405020304" charset="0"/>
-              <a:ea typeface="Calibri" panose="020F0502020204030204" pitchFamily="34" charset="0"/>
-              <a:cs typeface="Times New Roman" panose="02020603050405020304" charset="0"/>
-            </a:endParaRPr>
           </a:p>
           <a:p>
             <a:pPr marL="457200" indent="-457200" algn="just">
@@ -8002,14 +7747,6 @@
               </a:rPr>
               <a:t> seront utilisés pour analyser ces données.</a:t>
             </a:r>
-            <a:endParaRPr lang="fr-FR" altLang="zh-CN" sz="3100" b="1" dirty="0" smtClean="0">
-              <a:solidFill>
-                <a:schemeClr val="bg1"/>
-              </a:solidFill>
-              <a:latin typeface="Times New Roman" panose="02020603050405020304" charset="0"/>
-              <a:ea typeface="Calibri" panose="020F0502020204030204" pitchFamily="34" charset="0"/>
-              <a:cs typeface="Times New Roman" panose="02020603050405020304" charset="0"/>
-            </a:endParaRPr>
           </a:p>
         </p:txBody>
       </p:sp>
@@ -8398,7 +8135,20 @@
                 <a:latin typeface="Times New Roman" panose="02020603050405020304" charset="0"/>
                 <a:cs typeface="Times New Roman" panose="02020603050405020304" charset="0"/>
               </a:rPr>
-              <a:t>dans la plateforme GEE</a:t>
+              <a:t>dans la plateforme </a:t>
+            </a:r>
+            <a:r>
+              <a:rPr lang="fr-FR" altLang="en-US" sz="2800" b="1" dirty="0" smtClean="0">
+                <a:solidFill>
+                  <a:schemeClr val="accent4">
+                    <a:lumMod val="40000"/>
+                    <a:lumOff val="60000"/>
+                  </a:schemeClr>
+                </a:solidFill>
+                <a:latin typeface="Times New Roman" panose="02020603050405020304" charset="0"/>
+                <a:cs typeface="Times New Roman" panose="02020603050405020304" charset="0"/>
+              </a:rPr>
+              <a:t>GEE</a:t>
             </a:r>
             <a:endParaRPr lang="fr-FR" altLang="en-US" sz="2800" b="1" dirty="0">
               <a:solidFill>
@@ -8473,16 +8223,6 @@
               </a:rPr>
               <a:t>Des images satellitaires pour faire une étude de l’occupation du sol</a:t>
             </a:r>
-            <a:endParaRPr lang="fr-FR" altLang="en-US" sz="2800" b="1" dirty="0">
-              <a:solidFill>
-                <a:schemeClr val="accent4">
-                  <a:lumMod val="40000"/>
-                  <a:lumOff val="60000"/>
-                </a:schemeClr>
-              </a:solidFill>
-              <a:latin typeface="Times New Roman" panose="02020603050405020304" charset="0"/>
-              <a:cs typeface="Times New Roman" panose="02020603050405020304" charset="0"/>
-            </a:endParaRPr>
           </a:p>
         </p:txBody>
       </p:sp>
@@ -8695,7 +8435,7 @@
           <p:nvPr/>
         </p:nvPicPr>
         <p:blipFill>
-          <a:blip r:embed="rId1"/>
+          <a:blip r:embed="rId3"/>
           <a:stretch>
             <a:fillRect/>
           </a:stretch>
@@ -8718,7 +8458,7 @@
           </p:cNvGrpSpPr>
           <p:nvPr>
             <p:custDataLst>
-              <p:tags r:id="rId2"/>
+              <p:tags r:id="rId1"/>
             </p:custDataLst>
           </p:nvPr>
         </p:nvGrpSpPr>
@@ -8997,7 +8737,7 @@
           <p:nvPr/>
         </p:nvPicPr>
         <p:blipFill>
-          <a:blip r:embed="rId3" cstate="print">
+          <a:blip r:embed="rId4" cstate="print">
             <a:lum bright="70000" contrast="-70000"/>
             <a:extLst>
               <a:ext uri="{28A0092B-C50C-407E-A947-70E740481C1C}">
@@ -9209,11 +8949,6 @@
               </a:rPr>
               <a:t>le langage :</a:t>
             </a:r>
-            <a:endParaRPr lang="fr-FR" altLang="en-US" b="1" dirty="0">
-              <a:latin typeface="Times New Roman" panose="02020603050405020304" charset="0"/>
-              <a:ea typeface="Calibri" panose="020F0502020204030204" pitchFamily="34" charset="0"/>
-              <a:cs typeface="Times New Roman" panose="02020603050405020304" charset="0"/>
-            </a:endParaRPr>
           </a:p>
           <a:p>
             <a:pPr marL="285750" indent="-285750" algn="just" eaLnBrk="1" hangingPunct="1">
@@ -9231,11 +8966,6 @@
               </a:rPr>
               <a:t>SF        </a:t>
             </a:r>
-            <a:endParaRPr lang="fr-FR" altLang="en-US" b="1" dirty="0">
-              <a:latin typeface="Times New Roman" panose="02020603050405020304" charset="0"/>
-              <a:ea typeface="Calibri" panose="020F0502020204030204" pitchFamily="34" charset="0"/>
-              <a:cs typeface="Times New Roman" panose="02020603050405020304" charset="0"/>
-            </a:endParaRPr>
           </a:p>
           <a:p>
             <a:pPr marL="285750" indent="-285750" algn="just" eaLnBrk="1" hangingPunct="1">
@@ -9253,11 +8983,6 @@
               </a:rPr>
               <a:t>Terra , Raster</a:t>
             </a:r>
-            <a:endParaRPr lang="fr-FR" altLang="en-US" b="1" dirty="0">
-              <a:latin typeface="Times New Roman" panose="02020603050405020304" charset="0"/>
-              <a:ea typeface="Calibri" panose="020F0502020204030204" pitchFamily="34" charset="0"/>
-              <a:cs typeface="Times New Roman" panose="02020603050405020304" charset="0"/>
-            </a:endParaRPr>
           </a:p>
           <a:p>
             <a:pPr marL="285750" indent="-285750" algn="just" eaLnBrk="1" hangingPunct="1">
@@ -9303,11 +9028,6 @@
               </a:rPr>
               <a:t>et aussi avec l’usage de certains logiciels spatiaux pour l’extraction des données</a:t>
             </a:r>
-            <a:endParaRPr lang="fr-FR" altLang="en-US" b="1" dirty="0">
-              <a:latin typeface="Times New Roman" panose="02020603050405020304" charset="0"/>
-              <a:ea typeface="Calibri" panose="020F0502020204030204" pitchFamily="34" charset="0"/>
-              <a:cs typeface="Times New Roman" panose="02020603050405020304" charset="0"/>
-            </a:endParaRPr>
           </a:p>
           <a:p>
             <a:pPr marL="285750" indent="-285750" algn="just" eaLnBrk="1" hangingPunct="1">
@@ -9408,28 +9128,6 @@
               </a:rPr>
               <a:t>    </a:t>
             </a:r>
-            <a:endParaRPr lang="fr-FR" altLang="zh-CN" sz="4800" b="1" dirty="0">
-              <a:ln w="12700" cmpd="sng">
-                <a:noFill/>
-                <a:prstDash val="solid"/>
-              </a:ln>
-              <a:solidFill>
-                <a:schemeClr val="bg1"/>
-              </a:solidFill>
-              <a:effectLst>
-                <a:outerShdw blurRad="38100" dist="38100" dir="2700000" algn="tl">
-                  <a:srgbClr val="000000">
-                    <a:alpha val="43137"/>
-                  </a:srgbClr>
-                </a:outerShdw>
-              </a:effectLst>
-              <a:highlight>
-                <a:srgbClr val="000080"/>
-              </a:highlight>
-              <a:latin typeface="Times New Roman" panose="02020603050405020304" charset="0"/>
-              <a:ea typeface="Calibri" panose="020F0502020204030204" pitchFamily="34" charset="0"/>
-              <a:cs typeface="Times New Roman" panose="02020603050405020304" charset="0"/>
-            </a:endParaRPr>
           </a:p>
         </p:txBody>
       </p:sp>
@@ -9475,17 +9173,6 @@
               </a:rPr>
               <a:t>Les outils techniques</a:t>
             </a:r>
-            <a:endParaRPr lang="fr-FR" altLang="zh-CN" sz="3200" b="1" dirty="0">
-              <a:solidFill>
-                <a:schemeClr val="bg1"/>
-              </a:solidFill>
-              <a:highlight>
-                <a:srgbClr val="FF0000"/>
-              </a:highlight>
-              <a:latin typeface="Times New Roman" panose="02020603050405020304" charset="0"/>
-              <a:ea typeface="Calibri" panose="020F0502020204030204" pitchFamily="34" charset="0"/>
-              <a:cs typeface="Times New Roman" panose="02020603050405020304" charset="0"/>
-            </a:endParaRPr>
           </a:p>
         </p:txBody>
       </p:sp>
@@ -9624,7 +9311,7 @@
 </file>
 
 <file path=ppt/tags/tag1.xml><?xml version="1.0" encoding="utf-8"?>
-<p:tagLst xmlns:p="http://schemas.openxmlformats.org/presentationml/2006/main">
+<p:tagLst xmlns:a="http://schemas.openxmlformats.org/drawingml/2006/main" xmlns:r="http://schemas.openxmlformats.org/officeDocument/2006/relationships" xmlns:p="http://schemas.openxmlformats.org/presentationml/2006/main">
   <p:tag name="ISLIDE.DIAGRAM" val="211309"/>
 </p:tagLst>
 </file>
@@ -9880,6 +9567,8 @@
       </a:bgFillStyleLst>
     </a:fmtScheme>
   </a:themeElements>
+  <a:objectDefaults/>
+  <a:extraClrSchemeLst/>
   <a:extLst>
     <a:ext uri="{05A4C25C-085E-4340-85A3-A5531E510DB2}">
       <thm15:themeFamily xmlns:thm15="http://schemas.microsoft.com/office/thememl/2012/main" name="Office Theme" id="{62F939B6-93AF-4DB8-9C6B-D6C7DFDC589F}" vid="{4A3C46E8-61CC-4603-A589-7422A47A8E4A}"/>
@@ -10139,6 +9828,8 @@
       </a:bgFillStyleLst>
     </a:fmtScheme>
   </a:themeElements>
+  <a:objectDefaults/>
+  <a:extraClrSchemeLst/>
   <a:extLst>
     <a:ext uri="{05A4C25C-085E-4340-85A3-A5531E510DB2}">
       <thm15:themeFamily xmlns:thm15="http://schemas.microsoft.com/office/thememl/2012/main" name="Office Theme" id="{62F939B6-93AF-4DB8-9C6B-D6C7DFDC589F}" vid="{4A3C46E8-61CC-4603-A589-7422A47A8E4A}"/>
@@ -10398,6 +10089,8 @@
       </a:bgFillStyleLst>
     </a:fmtScheme>
   </a:themeElements>
+  <a:objectDefaults/>
+  <a:extraClrSchemeLst/>
   <a:extLst>
     <a:ext uri="{05A4C25C-085E-4340-85A3-A5531E510DB2}">
       <thm15:themeFamily xmlns:thm15="http://schemas.microsoft.com/office/thememl/2012/main" name="Office Theme" id="{62F939B6-93AF-4DB8-9C6B-D6C7DFDC589F}" vid="{4A3C46E8-61CC-4603-A589-7422A47A8E4A}"/>

</xml_diff>